<commit_message>
updating slides for Merge day
</commit_message>
<xml_diff>
--- a/ClassMaterials/MergeSort/Slides/Part1-MergeSort.pptx
+++ b/ClassMaterials/MergeSort/Slides/Part1-MergeSort.pptx
@@ -178,14 +178,6 @@
 </p:cmAuthorLst>
 </file>
 
-<file path=ppt/revisionInfo.xml><?xml version="1.0" encoding="utf-8"?>
-<p1510:revInfo xmlns:a="http://schemas.openxmlformats.org/drawingml/2006/main" xmlns:r="http://schemas.openxmlformats.org/officeDocument/2006/relationships" xmlns:p1510="http://schemas.microsoft.com/office/powerpoint/2015/10/main">
-  <p1510:revLst>
-    <p1510:client id="{D3F16C35-7113-468F-9417-58656C44C90E}" v="1" dt="2023-09-03T17:55:47.175"/>
-  </p1510:revLst>
-</p1510:revInfo>
-</file>
-
 <file path=ppt/changesInfos/changesInfo1.xml><?xml version="1.0" encoding="utf-8"?>
 <pc:chgInfo xmlns:a="http://schemas.openxmlformats.org/drawingml/2006/main" xmlns:r="http://schemas.openxmlformats.org/officeDocument/2006/relationships" xmlns:ac="http://schemas.microsoft.com/office/drawing/2013/main/command" xmlns:pc="http://schemas.microsoft.com/office/powerpoint/2013/main/command">
   <pc:docChgLst>
@@ -207,6 +199,38 @@
             <pc:docMk/>
             <pc:sldMk cId="0" sldId="304"/>
             <ac:spMk id="3" creationId="{DAAFB956-898E-B06E-D194-66ACA3A5F551}"/>
+          </ac:spMkLst>
+        </pc:spChg>
+      </pc:sldChg>
+    </pc:docChg>
+  </pc:docChgLst>
+  <pc:docChgLst>
+    <pc:chgData name="Yoder, Jason" userId="28f4d4d8-da04-4f86-b14d-a21675737bc5" providerId="ADAL" clId="{007A9A50-B83D-4767-A6DA-EDA4F9291D2C}"/>
+    <pc:docChg chg="modSld">
+      <pc:chgData name="Yoder, Jason" userId="28f4d4d8-da04-4f86-b14d-a21675737bc5" providerId="ADAL" clId="{007A9A50-B83D-4767-A6DA-EDA4F9291D2C}" dt="2023-11-06T14:19:30.882" v="46" actId="20577"/>
+      <pc:docMkLst>
+        <pc:docMk/>
+      </pc:docMkLst>
+      <pc:sldChg chg="modSp mod">
+        <pc:chgData name="Yoder, Jason" userId="28f4d4d8-da04-4f86-b14d-a21675737bc5" providerId="ADAL" clId="{007A9A50-B83D-4767-A6DA-EDA4F9291D2C}" dt="2023-11-06T14:19:30.882" v="46" actId="20577"/>
+        <pc:sldMkLst>
+          <pc:docMk/>
+          <pc:sldMk cId="0" sldId="304"/>
+        </pc:sldMkLst>
+        <pc:spChg chg="mod">
+          <ac:chgData name="Yoder, Jason" userId="28f4d4d8-da04-4f86-b14d-a21675737bc5" providerId="ADAL" clId="{007A9A50-B83D-4767-A6DA-EDA4F9291D2C}" dt="2023-11-06T14:19:30.882" v="46" actId="20577"/>
+          <ac:spMkLst>
+            <pc:docMk/>
+            <pc:sldMk cId="0" sldId="304"/>
+            <ac:spMk id="3" creationId="{DAAFB956-898E-B06E-D194-66ACA3A5F551}"/>
+          </ac:spMkLst>
+        </pc:spChg>
+        <pc:spChg chg="mod">
+          <ac:chgData name="Yoder, Jason" userId="28f4d4d8-da04-4f86-b14d-a21675737bc5" providerId="ADAL" clId="{007A9A50-B83D-4767-A6DA-EDA4F9291D2C}" dt="2023-11-06T12:56:45.514" v="36" actId="20577"/>
+          <ac:spMkLst>
+            <pc:docMk/>
+            <pc:sldMk cId="0" sldId="304"/>
+            <ac:spMk id="5" creationId="{0CAE7307-1561-AB49-AE8E-CD9D14D77EEA}"/>
           </ac:spMkLst>
         </pc:spChg>
       </pc:sldChg>
@@ -379,7 +403,7 @@
               <a:pPr>
                 <a:defRPr/>
               </a:pPr>
-              <a:t>9/3/2023</a:t>
+              <a:t>11/6/2023</a:t>
             </a:fld>
             <a:endParaRPr lang="en-US"/>
           </a:p>
@@ -614,7 +638,7 @@
               <a:pPr>
                 <a:defRPr/>
               </a:pPr>
-              <a:t>9/3/2023</a:t>
+              <a:t>11/6/2023</a:t>
             </a:fld>
             <a:endParaRPr lang="en-US"/>
           </a:p>
@@ -2165,7 +2189,7 @@
               <a:pPr>
                 <a:defRPr/>
               </a:pPr>
-              <a:t>Sunday, September 3, 2023</a:t>
+              <a:t>Monday, November 6, 2023</a:t>
             </a:fld>
             <a:endParaRPr lang="en-US"/>
           </a:p>
@@ -2348,7 +2372,7 @@
               <a:pPr>
                 <a:defRPr/>
               </a:pPr>
-              <a:t>Sunday, September 3, 2023</a:t>
+              <a:t>Monday, November 6, 2023</a:t>
             </a:fld>
             <a:endParaRPr lang="en-US"/>
           </a:p>
@@ -2541,7 +2565,7 @@
               <a:pPr>
                 <a:defRPr/>
               </a:pPr>
-              <a:t>Sunday, September 3, 2023</a:t>
+              <a:t>Monday, November 6, 2023</a:t>
             </a:fld>
             <a:endParaRPr lang="en-US"/>
           </a:p>
@@ -2724,7 +2748,7 @@
               <a:pPr>
                 <a:defRPr/>
               </a:pPr>
-              <a:t>Sunday, September 3, 2023</a:t>
+              <a:t>Monday, November 6, 2023</a:t>
             </a:fld>
             <a:endParaRPr lang="en-US"/>
           </a:p>
@@ -2984,7 +3008,7 @@
               <a:pPr>
                 <a:defRPr/>
               </a:pPr>
-              <a:t>Sunday, September 3, 2023</a:t>
+              <a:t>Monday, November 6, 2023</a:t>
             </a:fld>
             <a:endParaRPr lang="en-US"/>
           </a:p>
@@ -3284,7 +3308,7 @@
               <a:pPr>
                 <a:defRPr/>
               </a:pPr>
-              <a:t>Sunday, September 3, 2023</a:t>
+              <a:t>Monday, November 6, 2023</a:t>
             </a:fld>
             <a:endParaRPr lang="en-US"/>
           </a:p>
@@ -3718,7 +3742,7 @@
               <a:pPr>
                 <a:defRPr/>
               </a:pPr>
-              <a:t>Sunday, September 3, 2023</a:t>
+              <a:t>Monday, November 6, 2023</a:t>
             </a:fld>
             <a:endParaRPr lang="en-US"/>
           </a:p>
@@ -3850,7 +3874,7 @@
               <a:pPr>
                 <a:defRPr/>
               </a:pPr>
-              <a:t>Sunday, September 3, 2023</a:t>
+              <a:t>Monday, November 6, 2023</a:t>
             </a:fld>
             <a:endParaRPr lang="en-US"/>
           </a:p>
@@ -3960,7 +3984,7 @@
               <a:pPr>
                 <a:defRPr/>
               </a:pPr>
-              <a:t>Sunday, September 3, 2023</a:t>
+              <a:t>Monday, November 6, 2023</a:t>
             </a:fld>
             <a:endParaRPr lang="en-US"/>
           </a:p>
@@ -4250,7 +4274,7 @@
               <a:pPr>
                 <a:defRPr/>
               </a:pPr>
-              <a:t>Sunday, September 3, 2023</a:t>
+              <a:t>Monday, November 6, 2023</a:t>
             </a:fld>
             <a:endParaRPr lang="en-US"/>
           </a:p>
@@ -4517,7 +4541,7 @@
               <a:pPr>
                 <a:defRPr/>
               </a:pPr>
-              <a:t>Sunday, September 3, 2023</a:t>
+              <a:t>Monday, November 6, 2023</a:t>
             </a:fld>
             <a:endParaRPr lang="en-US"/>
           </a:p>
@@ -4743,7 +4767,7 @@
               <a:pPr>
                 <a:defRPr/>
               </a:pPr>
-              <a:t>Sunday, September 3, 2023</a:t>
+              <a:t>Monday, November 6, 2023</a:t>
             </a:fld>
             <a:endParaRPr lang="en-US"/>
           </a:p>
@@ -5212,8 +5236,8 @@
         </p:nvSpPr>
         <p:spPr>
           <a:xfrm>
-            <a:off x="304800" y="4991100"/>
-            <a:ext cx="8534400" cy="1295400"/>
+            <a:off x="304800" y="4322617"/>
+            <a:ext cx="8534400" cy="2254827"/>
           </a:xfrm>
           <a:prstGeom prst="rect">
             <a:avLst/>
@@ -5286,6 +5310,23 @@
             <a:r>
               <a:rPr lang="en-US" sz="2400" i="1" dirty="0" err="1"/>
               <a:t>PracticeMergeSortSimpleSolution</a:t>
+            </a:r>
+            <a:endParaRPr lang="en-US" sz="2400" i="1" dirty="0"/>
+          </a:p>
+          <a:p>
+            <a:r>
+              <a:rPr lang="en-US" sz="2400" dirty="0"/>
+              <a:t>The Quiz today is:</a:t>
+            </a:r>
+          </a:p>
+          <a:p>
+            <a:pPr marL="342900" indent="-342900">
+              <a:buFont typeface="Arial" panose="020B0604020202020204" pitchFamily="34" charset="0"/>
+              <a:buChar char="•"/>
+            </a:pPr>
+            <a:r>
+              <a:rPr lang="en-US" sz="2400" i="1" dirty="0" err="1"/>
+              <a:t>MergeSortQuiz</a:t>
             </a:r>
             <a:endParaRPr lang="en-US" sz="2400" i="1" dirty="0"/>
           </a:p>
@@ -5352,7 +5393,7 @@
                   <a:srgbClr val="FFFF00"/>
                 </a:highlight>
               </a:rPr>
-              <a:t>merging</a:t>
+              <a:t>__________</a:t>
             </a:r>
             <a:endParaRPr lang="en-US" sz="4400" dirty="0">
               <a:highlight>
@@ -9971,21 +10012,6 @@
 </file>
 
 <file path=customXml/item1.xml><?xml version="1.0" encoding="utf-8"?>
-<?mso-contentType ?>
-<FormTemplates xmlns="http://schemas.microsoft.com/sharepoint/v3/contenttype/forms">
-  <Display>DocumentLibraryForm</Display>
-  <Edit>DocumentLibraryForm</Edit>
-  <New>DocumentLibraryForm</New>
-</FormTemplates>
-</file>
-
-<file path=customXml/item2.xml><?xml version="1.0" encoding="utf-8"?>
-<p:properties xmlns:p="http://schemas.microsoft.com/office/2006/metadata/properties" xmlns:xsi="http://www.w3.org/2001/XMLSchema-instance" xmlns:pc="http://schemas.microsoft.com/office/infopath/2007/PartnerControls">
-  <documentManagement/>
-</p:properties>
-</file>
-
-<file path=customXml/item3.xml><?xml version="1.0" encoding="utf-8"?>
 <ct:contentTypeSchema xmlns:ct="http://schemas.microsoft.com/office/2006/metadata/contentType" xmlns:ma="http://schemas.microsoft.com/office/2006/metadata/properties/metaAttributes" ct:_="" ma:_="" ma:contentTypeName="Document" ma:contentTypeID="0x0101001570BCAAD2E4294F9443DCB038A55380" ma:contentTypeVersion="10" ma:contentTypeDescription="Create a new document." ma:contentTypeScope="" ma:versionID="84c2e02ee7a0dfaa743622fbac484332">
   <xsd:schema xmlns:xsd="http://www.w3.org/2001/XMLSchema" xmlns:xs="http://www.w3.org/2001/XMLSchema" xmlns:p="http://schemas.microsoft.com/office/2006/metadata/properties" xmlns:ns2="201674f6-2bdd-4f13-ba1e-424e4aa70473" targetNamespace="http://schemas.microsoft.com/office/2006/metadata/properties" ma:root="true" ma:fieldsID="0b220e6722f2c0d473d2d30e5cad202c" ns2:_="">
     <xsd:import namespace="201674f6-2bdd-4f13-ba1e-424e4aa70473"/>
@@ -10169,24 +10195,22 @@
 </ct:contentTypeSchema>
 </file>
 
-<file path=customXml/itemProps1.xml><?xml version="1.0" encoding="utf-8"?>
-<ds:datastoreItem xmlns:ds="http://schemas.openxmlformats.org/officeDocument/2006/customXml" ds:itemID="{B672D072-43D2-4244-93B0-C6CB1ACF616A}">
-  <ds:schemaRefs>
-    <ds:schemaRef ds:uri="http://schemas.microsoft.com/sharepoint/v3/contenttype/forms"/>
-  </ds:schemaRefs>
-</ds:datastoreItem>
+<file path=customXml/item2.xml><?xml version="1.0" encoding="utf-8"?>
+<p:properties xmlns:p="http://schemas.microsoft.com/office/2006/metadata/properties" xmlns:xsi="http://www.w3.org/2001/XMLSchema-instance" xmlns:pc="http://schemas.microsoft.com/office/infopath/2007/PartnerControls">
+  <documentManagement/>
+</p:properties>
 </file>
 
-<file path=customXml/itemProps2.xml><?xml version="1.0" encoding="utf-8"?>
-<ds:datastoreItem xmlns:ds="http://schemas.openxmlformats.org/officeDocument/2006/customXml" ds:itemID="{8BFBE333-608A-46DF-A4AF-FE0B5801DEF9}">
-  <ds:schemaRefs>
-    <ds:schemaRef ds:uri="http://schemas.microsoft.com/office/2006/metadata/properties"/>
-    <ds:schemaRef ds:uri="http://schemas.microsoft.com/office/infopath/2007/PartnerControls"/>
-  </ds:schemaRefs>
-</ds:datastoreItem>
+<file path=customXml/item3.xml><?xml version="1.0" encoding="utf-8"?>
+<?mso-contentType ?>
+<FormTemplates xmlns="http://schemas.microsoft.com/sharepoint/v3/contenttype/forms">
+  <Display>DocumentLibraryForm</Display>
+  <Edit>DocumentLibraryForm</Edit>
+  <New>DocumentLibraryForm</New>
+</FormTemplates>
 </file>
 
-<file path=customXml/itemProps3.xml><?xml version="1.0" encoding="utf-8"?>
+<file path=customXml/itemProps1.xml><?xml version="1.0" encoding="utf-8"?>
 <ds:datastoreItem xmlns:ds="http://schemas.openxmlformats.org/officeDocument/2006/customXml" ds:itemID="{6F428CFE-245D-43D8-B0D0-387487C5BF5A}">
   <ds:schemaRefs>
     <ds:schemaRef ds:uri="http://schemas.microsoft.com/office/2006/metadata/contentType"/>
@@ -10202,4 +10226,21 @@
     <ds:schemaRef ds:uri="http://schemas.microsoft.com/internal/obd"/>
   </ds:schemaRefs>
 </ds:datastoreItem>
+</file>
+
+<file path=customXml/itemProps2.xml><?xml version="1.0" encoding="utf-8"?>
+<ds:datastoreItem xmlns:ds="http://schemas.openxmlformats.org/officeDocument/2006/customXml" ds:itemID="{8BFBE333-608A-46DF-A4AF-FE0B5801DEF9}">
+  <ds:schemaRefs>
+    <ds:schemaRef ds:uri="http://schemas.microsoft.com/office/2006/metadata/properties"/>
+    <ds:schemaRef ds:uri="http://schemas.microsoft.com/office/infopath/2007/PartnerControls"/>
+  </ds:schemaRefs>
+</ds:datastoreItem>
+</file>
+
+<file path=customXml/itemProps3.xml><?xml version="1.0" encoding="utf-8"?>
+<ds:datastoreItem xmlns:ds="http://schemas.openxmlformats.org/officeDocument/2006/customXml" ds:itemID="{B672D072-43D2-4244-93B0-C6CB1ACF616A}">
+  <ds:schemaRefs>
+    <ds:schemaRef ds:uri="http://schemas.microsoft.com/sharepoint/v3/contenttype/forms"/>
+  </ds:schemaRefs>
+</ds:datastoreItem>
 </file>
</xml_diff>